<commit_message>
Updated the ppt file
</commit_message>
<xml_diff>
--- a/Presentation.pptx
+++ b/Presentation.pptx
@@ -5547,7 +5547,7 @@
         <p:spPr>
           <a:xfrm>
             <a:off x="13440714" y="4237084"/>
-            <a:ext cx="3558928" cy="2691972"/>
+            <a:ext cx="3558928" cy="2903808"/>
           </a:xfrm>
           <a:prstGeom prst="rect">
             <a:avLst/>
@@ -5567,7 +5567,7 @@
               <a:buChar char="•"/>
             </a:pPr>
             <a:r>
-              <a:rPr lang="en-US" sz="1386" spc="-55">
+              <a:rPr lang="en-US" sz="1386" spc="-55" dirty="0">
                 <a:solidFill>
                   <a:srgbClr val="D9D9D9"/>
                 </a:solidFill>
@@ -5588,7 +5588,7 @@
               <a:buChar char="•"/>
             </a:pPr>
             <a:r>
-              <a:rPr lang="en-US" sz="1386" spc="-55">
+              <a:rPr lang="en-US" sz="1386" spc="-55" dirty="0">
                 <a:solidFill>
                   <a:srgbClr val="D9D9D9"/>
                 </a:solidFill>
@@ -5609,7 +5609,7 @@
               <a:buChar char="•"/>
             </a:pPr>
             <a:r>
-              <a:rPr lang="en-US" sz="1386" spc="-55">
+              <a:rPr lang="en-US" sz="1386" spc="-55" dirty="0">
                 <a:solidFill>
                   <a:srgbClr val="D9D9D9"/>
                 </a:solidFill>
@@ -5630,7 +5630,7 @@
               <a:buChar char="•"/>
             </a:pPr>
             <a:r>
-              <a:rPr lang="en-US" sz="1386" spc="-55">
+              <a:rPr lang="en-US" sz="1386" spc="-55" dirty="0">
                 <a:solidFill>
                   <a:srgbClr val="D9D9D9"/>
                 </a:solidFill>
@@ -5643,7 +5643,7 @@
             </a:r>
           </a:p>
           <a:p>
-            <a:pPr marL="299428" lvl="1" indent="-149714" algn="l">
+            <a:pPr marL="756628" lvl="2" indent="-149714">
               <a:lnSpc>
                 <a:spcPts val="1941"/>
               </a:lnSpc>
@@ -5651,7 +5651,7 @@
               <a:buChar char="•"/>
             </a:pPr>
             <a:r>
-              <a:rPr lang="en-US" sz="1386" spc="-55">
+              <a:rPr lang="en-US" sz="1386" spc="-55" dirty="0">
                 <a:solidFill>
                   <a:srgbClr val="D9D9D9"/>
                 </a:solidFill>
@@ -5664,7 +5664,7 @@
             </a:r>
           </a:p>
           <a:p>
-            <a:pPr marL="299428" lvl="1" indent="-149714" algn="l">
+            <a:pPr marL="756628" lvl="2" indent="-149714">
               <a:lnSpc>
                 <a:spcPts val="1941"/>
               </a:lnSpc>
@@ -5672,7 +5672,7 @@
               <a:buChar char="•"/>
             </a:pPr>
             <a:r>
-              <a:rPr lang="en-US" sz="1386" spc="-55">
+              <a:rPr lang="en-US" sz="1386" spc="-55" dirty="0">
                 <a:solidFill>
                   <a:srgbClr val="D9D9D9"/>
                 </a:solidFill>
@@ -5690,7 +5690,7 @@
                 <a:spcPts val="1941"/>
               </a:lnSpc>
             </a:pPr>
-            <a:endParaRPr lang="en-US" sz="1386" spc="-55">
+            <a:endParaRPr lang="en-US" sz="1386" spc="-55" dirty="0">
               <a:solidFill>
                 <a:srgbClr val="D9D9D9"/>
               </a:solidFill>

</xml_diff>